<commit_message>
Minor correction to intro slides
</commit_message>
<xml_diff>
--- a/final-presentations/2021-03-25-iss/00-intro.pptx
+++ b/final-presentations/2021-03-25-iss/00-intro.pptx
@@ -275,7 +275,7 @@
           <a:p>
             <a:fld id="{0B842F42-2CE9-4E35-95C1-410DC08A50B1}" type="datetimeFigureOut">
               <a:rPr lang="en-US" smtClean="0"/>
-              <a:t>3/21/2021</a:t>
+              <a:t>3/25/2021</a:t>
             </a:fld>
             <a:endParaRPr lang="en-US"/>
           </a:p>
@@ -440,7 +440,7 @@
           <a:p>
             <a:fld id="{6F282904-F315-4730-8D91-37D99E141A6F}" type="datetimeFigureOut">
               <a:rPr lang="en-US" smtClean="0"/>
-              <a:t>3/21/2021</a:t>
+              <a:t>3/25/2021</a:t>
             </a:fld>
             <a:endParaRPr lang="en-US"/>
           </a:p>
@@ -10449,17 +10449,6 @@
             </a:r>
           </a:p>
           <a:p>
-            <a:pPr>
-              <a:spcBef>
-                <a:spcPts val="800"/>
-              </a:spcBef>
-            </a:pPr>
-            <a:r>
-              <a:rPr lang="en-US" sz="2000" dirty="0"/>
-              <a:t>We will demonstrate a few things during breaks in today’s tutorial (participation optional)</a:t>
-            </a:r>
-          </a:p>
-          <a:p>
             <a:pPr marL="0" indent="0">
               <a:spcBef>
                 <a:spcPts val="3600"/>
@@ -10467,8 +10456,12 @@
               <a:buNone/>
             </a:pPr>
             <a:r>
+              <a:rPr lang="en-US" b="1"/>
+              <a:t>Instructions </a:t>
+            </a:r>
+            <a:r>
               <a:rPr lang="en-US" b="1" dirty="0"/>
-              <a:t>Instructions on the tutorial web site: </a:t>
+              <a:t>on the tutorial web site: </a:t>
             </a:r>
             <a:r>
               <a:rPr lang="en-US" sz="2400" b="1" dirty="0">
@@ -11644,9 +11637,12 @@
 </file>
 
 <file path=customXml/item1.xml><?xml version="1.0" encoding="utf-8"?>
-<p:properties xmlns:p="http://schemas.microsoft.com/office/2006/metadata/properties" xmlns:xsi="http://www.w3.org/2001/XMLSchema-instance" xmlns:pc="http://schemas.microsoft.com/office/infopath/2007/PartnerControls">
-  <documentManagement/>
-</p:properties>
+<?mso-contentType ?>
+<FormTemplates xmlns="http://schemas.microsoft.com/sharepoint/v3/contenttype/forms">
+  <Display>DocumentLibraryForm</Display>
+  <Edit>DocumentLibraryForm</Edit>
+  <New>DocumentLibraryForm</New>
+</FormTemplates>
 </file>
 
 <file path=customXml/item2.xml><?xml version="1.0" encoding="utf-8"?>
@@ -11699,24 +11695,15 @@
 </file>
 
 <file path=customXml/item3.xml><?xml version="1.0" encoding="utf-8"?>
-<?mso-contentType ?>
-<FormTemplates xmlns="http://schemas.microsoft.com/sharepoint/v3/contenttype/forms">
-  <Display>DocumentLibraryForm</Display>
-  <Edit>DocumentLibraryForm</Edit>
-  <New>DocumentLibraryForm</New>
-</FormTemplates>
+<p:properties xmlns:p="http://schemas.microsoft.com/office/2006/metadata/properties" xmlns:xsi="http://www.w3.org/2001/XMLSchema-instance" xmlns:pc="http://schemas.microsoft.com/office/infopath/2007/PartnerControls">
+  <documentManagement/>
+</p:properties>
 </file>
 
 <file path=customXml/itemProps1.xml><?xml version="1.0" encoding="utf-8"?>
-<ds:datastoreItem xmlns:ds="http://schemas.openxmlformats.org/officeDocument/2006/customXml" ds:itemID="{A50EC660-24D0-43A0-AE5E-E274115E726B}">
+<ds:datastoreItem xmlns:ds="http://schemas.openxmlformats.org/officeDocument/2006/customXml" ds:itemID="{19E20559-B232-4371-8690-E3D8007EDB82}">
   <ds:schemaRefs>
-    <ds:schemaRef ds:uri="http://schemas.microsoft.com/office/2006/documentManagement/types"/>
-    <ds:schemaRef ds:uri="http://purl.org/dc/elements/1.1/"/>
-    <ds:schemaRef ds:uri="http://schemas.microsoft.com/office/2006/metadata/properties"/>
-    <ds:schemaRef ds:uri="http://purl.org/dc/terms/"/>
-    <ds:schemaRef ds:uri="http://schemas.openxmlformats.org/package/2006/metadata/core-properties"/>
-    <ds:schemaRef ds:uri="http://www.w3.org/XML/1998/namespace"/>
-    <ds:schemaRef ds:uri="http://purl.org/dc/dcmitype/"/>
+    <ds:schemaRef ds:uri="http://schemas.microsoft.com/sharepoint/v3/contenttype/forms"/>
   </ds:schemaRefs>
 </ds:datastoreItem>
 </file>
@@ -11737,9 +11724,16 @@
 </file>
 
 <file path=customXml/itemProps3.xml><?xml version="1.0" encoding="utf-8"?>
-<ds:datastoreItem xmlns:ds="http://schemas.openxmlformats.org/officeDocument/2006/customXml" ds:itemID="{19E20559-B232-4371-8690-E3D8007EDB82}">
+<ds:datastoreItem xmlns:ds="http://schemas.openxmlformats.org/officeDocument/2006/customXml" ds:itemID="{A50EC660-24D0-43A0-AE5E-E274115E726B}">
   <ds:schemaRefs>
-    <ds:schemaRef ds:uri="http://schemas.microsoft.com/sharepoint/v3/contenttype/forms"/>
+    <ds:schemaRef ds:uri="http://schemas.microsoft.com/office/2006/documentManagement/types"/>
+    <ds:schemaRef ds:uri="http://purl.org/dc/elements/1.1/"/>
+    <ds:schemaRef ds:uri="http://schemas.microsoft.com/office/2006/metadata/properties"/>
+    <ds:schemaRef ds:uri="http://purl.org/dc/terms/"/>
+    <ds:schemaRef ds:uri="http://schemas.openxmlformats.org/package/2006/metadata/core-properties"/>
+    <ds:schemaRef ds:uri="http://www.w3.org/XML/1998/namespace"/>
+    <ds:schemaRef ds:uri="http://purl.org/dc/dcmitype/"/>
+    <ds:schemaRef ds:uri="http://schemas.microsoft.com/office/infopath/2007/PartnerControls"/>
   </ds:schemaRefs>
 </ds:datastoreItem>
 </file>
</xml_diff>